<commit_message>
update slides, add readme
</commit_message>
<xml_diff>
--- a/slides.pptx
+++ b/slides.pptx
@@ -9436,16 +9436,7 @@
                 </a:solidFill>
                 <a:hlinkClick r:id="rId3"/>
               </a:rPr>
-              <a:t>http://</a:t>
-            </a:r>
-            <a:r>
-              <a:rPr lang="en-US" i="1" dirty="0" smtClean="0">
-                <a:solidFill>
-                  <a:srgbClr val="FFC800"/>
-                </a:solidFill>
-                <a:hlinkClick r:id="rId3"/>
-              </a:rPr>
-              <a:t>www.mmds.org</a:t>
+              <a:t>http://www.mmds.org</a:t>
             </a:r>
             <a:endParaRPr lang="en-US" i="1" dirty="0" smtClean="0">
               <a:solidFill>
@@ -21272,16 +21263,11 @@
               <a:rPr lang="en-US" b="1" dirty="0" smtClean="0"/>
               <a:t>Distributed computations and file systems</a:t>
             </a:r>
-            <a:endParaRPr lang="en-US" b="1" dirty="0" smtClean="0"/>
           </a:p>
           <a:p>
             <a:r>
               <a:rPr lang="en-US" b="1" dirty="0" smtClean="0"/>
-              <a:t>Problems and </a:t>
-            </a:r>
-            <a:r>
-              <a:rPr lang="en-US" b="1" dirty="0" smtClean="0"/>
-              <a:t>algorithms</a:t>
+              <a:t>Problems and algorithms</a:t>
             </a:r>
           </a:p>
           <a:p>
@@ -21306,26 +21292,14 @@
           <a:p>
             <a:r>
               <a:rPr lang="en-US" b="1" dirty="0" smtClean="0"/>
-              <a:t>… </a:t>
-            </a:r>
-            <a:r>
-              <a:rPr lang="en-US" b="1" dirty="0" smtClean="0"/>
-              <a:t>many buzzwords</a:t>
+              <a:t>… many buzzwords</a:t>
             </a:r>
             <a:br>
               <a:rPr lang="en-US" b="1" dirty="0" smtClean="0"/>
             </a:br>
             <a:r>
               <a:rPr lang="en-US" b="0" dirty="0" smtClean="0"/>
-              <a:t>Hadoop, Pig</a:t>
-            </a:r>
-            <a:r>
-              <a:rPr lang="en-US" b="0" dirty="0" smtClean="0"/>
-              <a:t>, Hive, Spark, </a:t>
-            </a:r>
-            <a:r>
-              <a:rPr lang="en-US" b="0" dirty="0" smtClean="0"/>
-              <a:t>…</a:t>
+              <a:t>Hadoop, Pig, Hive, Spark, …</a:t>
             </a:r>
             <a:r>
               <a:rPr lang="en-US" b="0" dirty="0"/>
@@ -21333,15 +21307,7 @@
             </a:r>
             <a:r>
               <a:rPr lang="en-US" b="0" dirty="0" smtClean="0"/>
-              <a:t>i</a:t>
-            </a:r>
-            <a:r>
-              <a:rPr lang="en-US" b="0" dirty="0" smtClean="0"/>
-              <a:t>s </a:t>
-            </a:r>
-            <a:r>
-              <a:rPr lang="en-US" b="0" dirty="0" smtClean="0"/>
-              <a:t>it </a:t>
+              <a:t>is it </a:t>
             </a:r>
             <a:r>
               <a:rPr lang="en-US" b="0" dirty="0" err="1" smtClean="0"/>
@@ -28312,11 +28278,7 @@
           <a:p>
             <a:r>
               <a:rPr lang="en-US" dirty="0" smtClean="0"/>
-              <a:t>Example: Sorting </a:t>
-            </a:r>
-            <a:r>
-              <a:rPr lang="en-US" dirty="0" smtClean="0"/>
-              <a:t>with MapReduce</a:t>
+              <a:t>Example: Sorting with MapReduce</a:t>
             </a:r>
             <a:endParaRPr lang="en-US" dirty="0"/>
           </a:p>
@@ -35700,11 +35662,7 @@
             </a:r>
             <a:r>
               <a:rPr lang="de-DE" b="1" dirty="0" smtClean="0"/>
-              <a:t> </a:t>
-            </a:r>
-            <a:r>
-              <a:rPr lang="de-DE" b="1" dirty="0" smtClean="0"/>
-              <a:t>a </a:t>
+              <a:t> a </a:t>
             </a:r>
             <a:r>
               <a:rPr lang="de-DE" b="1" dirty="0" err="1" smtClean="0"/>
@@ -35722,7 +35680,6 @@
               <a:rPr lang="de-DE" b="1" dirty="0" smtClean="0"/>
               <a:t> alternative</a:t>
             </a:r>
-            <a:endParaRPr lang="de-DE" b="1" dirty="0" smtClean="0"/>
           </a:p>
           <a:p>
             <a:pPr lvl="1"/>
@@ -36553,15 +36510,11 @@
             </a:r>
             <a:r>
               <a:rPr lang="de-DE" dirty="0" err="1" smtClean="0"/>
-              <a:t>partitioning</a:t>
-            </a:r>
-            <a:r>
-              <a:rPr lang="de-DE" dirty="0" smtClean="0"/>
-              <a:t> </a:t>
-            </a:r>
-            <a:r>
-              <a:rPr lang="de-DE" dirty="0" err="1" smtClean="0"/>
-              <a:t>allows</a:t>
+              <a:t>shuffling</a:t>
+            </a:r>
+            <a:r>
+              <a:rPr lang="de-DE" smtClean="0"/>
+              <a:t> allows</a:t>
             </a:r>
             <a:r>
               <a:rPr lang="de-DE" dirty="0" smtClean="0"/>
@@ -40572,7 +40525,6 @@
               <a:rPr lang="de-DE" b="1" dirty="0" smtClean="0"/>
               <a:t>):</a:t>
             </a:r>
-            <a:endParaRPr lang="de-DE" b="1" dirty="0" smtClean="0"/>
           </a:p>
           <a:p>
             <a:pPr lvl="1"/>

</xml_diff>

<commit_message>
update for lecture on April 25, 2018
</commit_message>
<xml_diff>
--- a/slides.pptx
+++ b/slides.pptx
@@ -289,7 +289,7 @@
             <a:fld id="{D3E28C4F-4FE9-4D22-93D8-487A4D01D983}" type="datetimeFigureOut">
               <a:rPr lang="en-US" smtClean="0"/>
               <a:pPr/>
-              <a:t>4/23/2018</a:t>
+              <a:t>4/26/2018</a:t>
             </a:fld>
             <a:endParaRPr lang="en-US"/>
           </a:p>
@@ -456,7 +456,7 @@
             <a:fld id="{EE18CB36-612C-4E4A-AC83-E89476AEC2BF}" type="datetimeFigureOut">
               <a:rPr lang="en-US" smtClean="0"/>
               <a:pPr/>
-              <a:t>4/23/2018</a:t>
+              <a:t>4/26/2018</a:t>
             </a:fld>
             <a:endParaRPr lang="en-US"/>
           </a:p>
@@ -1790,7 +1790,7 @@
           <a:p>
             <a:fld id="{74E0B15C-66BF-4548-B9F7-ABFD8B692764}" type="datetime1">
               <a:rPr lang="en-US" smtClean="0"/>
-              <a:t>4/23/2018</a:t>
+              <a:t>4/26/2018</a:t>
             </a:fld>
             <a:endParaRPr lang="en-US"/>
           </a:p>
@@ -2011,7 +2011,7 @@
           <a:p>
             <a:fld id="{587E39B9-8394-4A3F-AE29-D25E40635A66}" type="datetime1">
               <a:rPr lang="en-US" smtClean="0"/>
-              <a:t>4/23/2018</a:t>
+              <a:t>4/26/2018</a:t>
             </a:fld>
             <a:endParaRPr lang="en-US"/>
           </a:p>
@@ -2286,7 +2286,7 @@
           <a:p>
             <a:fld id="{6E89BE1B-109A-4A1E-A524-238B7EF05396}" type="datetime1">
               <a:rPr lang="en-US" smtClean="0"/>
-              <a:t>4/23/2018</a:t>
+              <a:t>4/26/2018</a:t>
             </a:fld>
             <a:endParaRPr lang="en-US"/>
           </a:p>
@@ -2501,7 +2501,7 @@
           <a:p>
             <a:fld id="{8B8FAD7C-9E74-490A-9976-CEAC407DBF81}" type="datetime1">
               <a:rPr lang="en-US" smtClean="0"/>
-              <a:t>4/23/2018</a:t>
+              <a:t>4/26/2018</a:t>
             </a:fld>
             <a:endParaRPr lang="en-GB"/>
           </a:p>
@@ -2762,7 +2762,7 @@
           <a:p>
             <a:fld id="{8667AA6D-B4FD-46B1-B3E9-B042C52C85A2}" type="datetime1">
               <a:rPr lang="en-US" smtClean="0"/>
-              <a:t>4/23/2018</a:t>
+              <a:t>4/26/2018</a:t>
             </a:fld>
             <a:endParaRPr lang="en-US"/>
           </a:p>
@@ -2981,7 +2981,7 @@
                 </a:solidFill>
               </a:rPr>
               <a:pPr/>
-              <a:t>4/23/2018</a:t>
+              <a:t>4/26/2018</a:t>
             </a:fld>
             <a:endParaRPr lang="en-US">
               <a:solidFill>
@@ -3211,7 +3211,7 @@
                 </a:solidFill>
               </a:rPr>
               <a:pPr/>
-              <a:t>4/23/2018</a:t>
+              <a:t>4/26/2018</a:t>
             </a:fld>
             <a:endParaRPr lang="en-US">
               <a:solidFill>
@@ -3488,7 +3488,7 @@
                 </a:solidFill>
               </a:rPr>
               <a:pPr/>
-              <a:t>4/23/2018</a:t>
+              <a:t>4/26/2018</a:t>
             </a:fld>
             <a:endParaRPr lang="en-US">
               <a:solidFill>
@@ -3749,7 +3749,7 @@
                 </a:solidFill>
               </a:rPr>
               <a:pPr/>
-              <a:t>4/23/2018</a:t>
+              <a:t>4/26/2018</a:t>
             </a:fld>
             <a:endParaRPr lang="en-US">
               <a:solidFill>
@@ -4145,7 +4145,7 @@
                 </a:solidFill>
               </a:rPr>
               <a:pPr/>
-              <a:t>4/23/2018</a:t>
+              <a:t>4/26/2018</a:t>
             </a:fld>
             <a:endParaRPr lang="en-US">
               <a:solidFill>
@@ -4294,7 +4294,7 @@
                 </a:solidFill>
               </a:rPr>
               <a:pPr/>
-              <a:t>4/23/2018</a:t>
+              <a:t>4/26/2018</a:t>
             </a:fld>
             <a:endParaRPr lang="en-US">
               <a:solidFill>
@@ -4493,7 +4493,7 @@
           <a:p>
             <a:fld id="{649A1004-7A34-4C69-A29F-7848CCE72792}" type="datetime1">
               <a:rPr lang="en-US" smtClean="0"/>
-              <a:t>4/23/2018</a:t>
+              <a:t>4/26/2018</a:t>
             </a:fld>
             <a:endParaRPr lang="en-US"/>
           </a:p>
@@ -4594,7 +4594,7 @@
                 </a:solidFill>
               </a:rPr>
               <a:pPr/>
-              <a:t>4/23/2018</a:t>
+              <a:t>4/26/2018</a:t>
             </a:fld>
             <a:endParaRPr lang="en-US">
               <a:solidFill>
@@ -4901,7 +4901,7 @@
                 </a:solidFill>
               </a:rPr>
               <a:pPr/>
-              <a:t>4/23/2018</a:t>
+              <a:t>4/26/2018</a:t>
             </a:fld>
             <a:endParaRPr lang="en-US">
               <a:solidFill>
@@ -5185,7 +5185,7 @@
                 </a:solidFill>
               </a:rPr>
               <a:pPr/>
-              <a:t>4/23/2018</a:t>
+              <a:t>4/26/2018</a:t>
             </a:fld>
             <a:endParaRPr lang="en-US">
               <a:solidFill>
@@ -5385,7 +5385,7 @@
                 </a:solidFill>
               </a:rPr>
               <a:pPr/>
-              <a:t>4/23/2018</a:t>
+              <a:t>4/26/2018</a:t>
             </a:fld>
             <a:endParaRPr lang="en-US">
               <a:solidFill>
@@ -5595,7 +5595,7 @@
                 </a:solidFill>
               </a:rPr>
               <a:pPr/>
-              <a:t>4/23/2018</a:t>
+              <a:t>4/26/2018</a:t>
             </a:fld>
             <a:endParaRPr lang="en-US">
               <a:solidFill>
@@ -5980,7 +5980,7 @@
           <a:p>
             <a:fld id="{27D1924C-0E5F-41F9-9EF2-A30D8DD943B5}" type="datetime1">
               <a:rPr lang="en-US" smtClean="0"/>
-              <a:t>4/23/2018</a:t>
+              <a:t>4/26/2018</a:t>
             </a:fld>
             <a:endParaRPr lang="en-US"/>
           </a:p>
@@ -6268,7 +6268,7 @@
           <a:p>
             <a:fld id="{CBD3F3B2-6969-4711-938A-F55A29B51480}" type="datetime1">
               <a:rPr lang="en-US" smtClean="0"/>
-              <a:t>4/23/2018</a:t>
+              <a:t>4/26/2018</a:t>
             </a:fld>
             <a:endParaRPr lang="en-US"/>
           </a:p>
@@ -6693,7 +6693,7 @@
           <a:p>
             <a:fld id="{D538DACF-DAC8-4C22-99F4-5AC8B8C6B7F9}" type="datetime1">
               <a:rPr lang="en-US" smtClean="0"/>
-              <a:t>4/23/2018</a:t>
+              <a:t>4/26/2018</a:t>
             </a:fld>
             <a:endParaRPr lang="en-US"/>
           </a:p>
@@ -6809,7 +6809,7 @@
           <a:p>
             <a:fld id="{50F84880-51F2-491D-B30A-1FC47B871D77}" type="datetime1">
               <a:rPr lang="en-US" smtClean="0"/>
-              <a:t>4/23/2018</a:t>
+              <a:t>4/26/2018</a:t>
             </a:fld>
             <a:endParaRPr lang="en-US"/>
           </a:p>
@@ -6903,7 +6903,7 @@
           <a:p>
             <a:fld id="{D5DC6C30-2214-40E2-AEE5-9AE66D1057D0}" type="datetime1">
               <a:rPr lang="en-US" smtClean="0"/>
-              <a:t>4/23/2018</a:t>
+              <a:t>4/26/2018</a:t>
             </a:fld>
             <a:endParaRPr lang="en-US"/>
           </a:p>
@@ -7184,7 +7184,7 @@
           <a:p>
             <a:fld id="{BC6C5491-B905-4984-8643-1B7C9312C1C7}" type="datetime1">
               <a:rPr lang="en-US" smtClean="0"/>
-              <a:t>4/23/2018</a:t>
+              <a:t>4/26/2018</a:t>
             </a:fld>
             <a:endParaRPr lang="en-US"/>
           </a:p>
@@ -7549,7 +7549,7 @@
           <a:p>
             <a:fld id="{0D1BAC21-6A2B-4248-BF0F-2BED273A4141}" type="datetime1">
               <a:rPr lang="en-US" smtClean="0"/>
-              <a:t>4/23/2018</a:t>
+              <a:t>4/26/2018</a:t>
             </a:fld>
             <a:endParaRPr lang="en-US"/>
           </a:p>
@@ -7978,7 +7978,7 @@
           <a:p>
             <a:fld id="{C998EF77-6613-48F2-974F-C60E70302254}" type="datetime1">
               <a:rPr lang="en-US" smtClean="0"/>
-              <a:t>4/23/2018</a:t>
+              <a:t>4/26/2018</a:t>
             </a:fld>
             <a:endParaRPr lang="en-US"/>
           </a:p>
@@ -8539,7 +8539,7 @@
                 </a:solidFill>
               </a:rPr>
               <a:pPr/>
-              <a:t>4/23/2018</a:t>
+              <a:t>4/26/2018</a:t>
             </a:fld>
             <a:endParaRPr lang="en-US">
               <a:solidFill>
@@ -9267,8 +9267,8 @@
           </a:p>
           <a:p>
             <a:r>
-              <a:rPr lang="en-US" sz="2000" dirty="0"/>
-              <a:t>14/04/2016</a:t>
+              <a:rPr lang="en-US" sz="2000"/>
+              <a:t>25/04/2018</a:t>
             </a:r>
             <a:endParaRPr lang="en-US" sz="750" dirty="0"/>
           </a:p>

</xml_diff>